<commit_message>
Be compatible with MATLAB 2018
Former-commit-id: c0f05ac03a471ca58592b58fc757aff2e321aa42
Former-commit-id: 2b34582f7058fdb0d046f36c9820ae61faf39741
</commit_message>
<xml_diff>
--- a/doc/git_workflow.pptx
+++ b/doc/git_workflow.pptx
@@ -245,7 +245,7 @@
           <a:p>
             <a:fld id="{71E1F26E-4D96-464F-8976-1978778C0E8A}" type="datetimeFigureOut">
               <a:rPr lang="en-US" smtClean="0"/>
-              <a:t>7/10/2019</a:t>
+              <a:t>7/22/2019</a:t>
             </a:fld>
             <a:endParaRPr lang="en-US"/>
           </a:p>
@@ -415,7 +415,7 @@
           <a:p>
             <a:fld id="{71E1F26E-4D96-464F-8976-1978778C0E8A}" type="datetimeFigureOut">
               <a:rPr lang="en-US" smtClean="0"/>
-              <a:t>7/10/2019</a:t>
+              <a:t>7/22/2019</a:t>
             </a:fld>
             <a:endParaRPr lang="en-US"/>
           </a:p>
@@ -595,7 +595,7 @@
           <a:p>
             <a:fld id="{71E1F26E-4D96-464F-8976-1978778C0E8A}" type="datetimeFigureOut">
               <a:rPr lang="en-US" smtClean="0"/>
-              <a:t>7/10/2019</a:t>
+              <a:t>7/22/2019</a:t>
             </a:fld>
             <a:endParaRPr lang="en-US"/>
           </a:p>
@@ -765,7 +765,7 @@
           <a:p>
             <a:fld id="{71E1F26E-4D96-464F-8976-1978778C0E8A}" type="datetimeFigureOut">
               <a:rPr lang="en-US" smtClean="0"/>
-              <a:t>7/10/2019</a:t>
+              <a:t>7/22/2019</a:t>
             </a:fld>
             <a:endParaRPr lang="en-US"/>
           </a:p>
@@ -1011,7 +1011,7 @@
           <a:p>
             <a:fld id="{71E1F26E-4D96-464F-8976-1978778C0E8A}" type="datetimeFigureOut">
               <a:rPr lang="en-US" smtClean="0"/>
-              <a:t>7/10/2019</a:t>
+              <a:t>7/22/2019</a:t>
             </a:fld>
             <a:endParaRPr lang="en-US"/>
           </a:p>
@@ -1243,7 +1243,7 @@
           <a:p>
             <a:fld id="{71E1F26E-4D96-464F-8976-1978778C0E8A}" type="datetimeFigureOut">
               <a:rPr lang="en-US" smtClean="0"/>
-              <a:t>7/10/2019</a:t>
+              <a:t>7/22/2019</a:t>
             </a:fld>
             <a:endParaRPr lang="en-US"/>
           </a:p>
@@ -1610,7 +1610,7 @@
           <a:p>
             <a:fld id="{71E1F26E-4D96-464F-8976-1978778C0E8A}" type="datetimeFigureOut">
               <a:rPr lang="en-US" smtClean="0"/>
-              <a:t>7/10/2019</a:t>
+              <a:t>7/22/2019</a:t>
             </a:fld>
             <a:endParaRPr lang="en-US"/>
           </a:p>
@@ -1728,7 +1728,7 @@
           <a:p>
             <a:fld id="{71E1F26E-4D96-464F-8976-1978778C0E8A}" type="datetimeFigureOut">
               <a:rPr lang="en-US" smtClean="0"/>
-              <a:t>7/10/2019</a:t>
+              <a:t>7/22/2019</a:t>
             </a:fld>
             <a:endParaRPr lang="en-US"/>
           </a:p>
@@ -1823,7 +1823,7 @@
           <a:p>
             <a:fld id="{71E1F26E-4D96-464F-8976-1978778C0E8A}" type="datetimeFigureOut">
               <a:rPr lang="en-US" smtClean="0"/>
-              <a:t>7/10/2019</a:t>
+              <a:t>7/22/2019</a:t>
             </a:fld>
             <a:endParaRPr lang="en-US"/>
           </a:p>
@@ -2100,7 +2100,7 @@
           <a:p>
             <a:fld id="{71E1F26E-4D96-464F-8976-1978778C0E8A}" type="datetimeFigureOut">
               <a:rPr lang="en-US" smtClean="0"/>
-              <a:t>7/10/2019</a:t>
+              <a:t>7/22/2019</a:t>
             </a:fld>
             <a:endParaRPr lang="en-US"/>
           </a:p>
@@ -2353,7 +2353,7 @@
           <a:p>
             <a:fld id="{71E1F26E-4D96-464F-8976-1978778C0E8A}" type="datetimeFigureOut">
               <a:rPr lang="en-US" smtClean="0"/>
-              <a:t>7/10/2019</a:t>
+              <a:t>7/22/2019</a:t>
             </a:fld>
             <a:endParaRPr lang="en-US"/>
           </a:p>
@@ -2566,7 +2566,7 @@
           <a:p>
             <a:fld id="{71E1F26E-4D96-464F-8976-1978778C0E8A}" type="datetimeFigureOut">
               <a:rPr lang="en-US" smtClean="0"/>
-              <a:t>7/10/2019</a:t>
+              <a:t>7/22/2019</a:t>
             </a:fld>
             <a:endParaRPr lang="en-US"/>
           </a:p>
@@ -3712,7 +3712,7 @@
         <p:spPr>
           <a:xfrm>
             <a:off x="838200" y="1019212"/>
-            <a:ext cx="8826909" cy="5632311"/>
+            <a:ext cx="8826909" cy="5940088"/>
           </a:xfrm>
           <a:prstGeom prst="rect">
             <a:avLst/>
@@ -3773,8 +3773,17 @@
             </a:r>
             <a:r>
               <a:rPr lang="en-US" sz="2000" dirty="0" smtClean="0"/>
-              <a:t> fetch the ‘develop’ branch to the local repo</a:t>
-            </a:r>
+              <a:t> fetch the ‘develop’ branch to the local </a:t>
+            </a:r>
+            <a:r>
+              <a:rPr lang="en-US" sz="2000" dirty="0" smtClean="0"/>
+              <a:t>repo (You need go to the </a:t>
+            </a:r>
+            <a:r>
+              <a:rPr lang="en-US" sz="2000" smtClean="0"/>
+              <a:t>repository directory first)</a:t>
+            </a:r>
+            <a:endParaRPr lang="en-US" sz="2000" dirty="0" smtClean="0"/>
           </a:p>
           <a:p>
             <a:pPr marL="800100" lvl="1" indent="-342900">
@@ -3907,37 +3916,7 @@
                   </a:schemeClr>
                 </a:solidFill>
               </a:rPr>
-              <a:t> </a:t>
-            </a:r>
-            <a:r>
-              <a:rPr lang="en-US" sz="2000" smtClean="0">
-                <a:solidFill>
-                  <a:schemeClr val="accent2">
-                    <a:lumMod val="75000"/>
-                  </a:schemeClr>
-                </a:solidFill>
-              </a:rPr>
-              <a:t>pull </a:t>
-            </a:r>
-            <a:r>
-              <a:rPr lang="en-US" sz="2000" smtClean="0">
-                <a:solidFill>
-                  <a:schemeClr val="accent2">
-                    <a:lumMod val="75000"/>
-                  </a:schemeClr>
-                </a:solidFill>
-              </a:rPr>
-              <a:t>origin dev       </a:t>
-            </a:r>
-            <a:r>
-              <a:rPr lang="en-US" sz="2000" dirty="0" smtClean="0">
-                <a:solidFill>
-                  <a:schemeClr val="accent2">
-                    <a:lumMod val="75000"/>
-                  </a:schemeClr>
-                </a:solidFill>
-              </a:rPr>
-              <a:t># (pull the recent from remote repo update first)</a:t>
+              <a:t> pull origin dev       # (pull the recent from remote repo update first)</a:t>
             </a:r>
           </a:p>
           <a:p>

</xml_diff>

<commit_message>
enable NR retrievals for pollyxt_lacros
Former-commit-id: 2d0faa48b56733f4b7d0e8411d6e7eb38b556a67
Former-commit-id: c18628b3d5b4699781a6c36492f6116a25d84517
</commit_message>
<xml_diff>
--- a/doc/git_workflow.pptx
+++ b/doc/git_workflow.pptx
@@ -245,7 +245,7 @@
           <a:p>
             <a:fld id="{71E1F26E-4D96-464F-8976-1978778C0E8A}" type="datetimeFigureOut">
               <a:rPr lang="en-US" smtClean="0"/>
-              <a:t>7/22/2019</a:t>
+              <a:t>8/6/2019</a:t>
             </a:fld>
             <a:endParaRPr lang="en-US"/>
           </a:p>
@@ -415,7 +415,7 @@
           <a:p>
             <a:fld id="{71E1F26E-4D96-464F-8976-1978778C0E8A}" type="datetimeFigureOut">
               <a:rPr lang="en-US" smtClean="0"/>
-              <a:t>7/22/2019</a:t>
+              <a:t>8/6/2019</a:t>
             </a:fld>
             <a:endParaRPr lang="en-US"/>
           </a:p>
@@ -595,7 +595,7 @@
           <a:p>
             <a:fld id="{71E1F26E-4D96-464F-8976-1978778C0E8A}" type="datetimeFigureOut">
               <a:rPr lang="en-US" smtClean="0"/>
-              <a:t>7/22/2019</a:t>
+              <a:t>8/6/2019</a:t>
             </a:fld>
             <a:endParaRPr lang="en-US"/>
           </a:p>
@@ -765,7 +765,7 @@
           <a:p>
             <a:fld id="{71E1F26E-4D96-464F-8976-1978778C0E8A}" type="datetimeFigureOut">
               <a:rPr lang="en-US" smtClean="0"/>
-              <a:t>7/22/2019</a:t>
+              <a:t>8/6/2019</a:t>
             </a:fld>
             <a:endParaRPr lang="en-US"/>
           </a:p>
@@ -1011,7 +1011,7 @@
           <a:p>
             <a:fld id="{71E1F26E-4D96-464F-8976-1978778C0E8A}" type="datetimeFigureOut">
               <a:rPr lang="en-US" smtClean="0"/>
-              <a:t>7/22/2019</a:t>
+              <a:t>8/6/2019</a:t>
             </a:fld>
             <a:endParaRPr lang="en-US"/>
           </a:p>
@@ -1243,7 +1243,7 @@
           <a:p>
             <a:fld id="{71E1F26E-4D96-464F-8976-1978778C0E8A}" type="datetimeFigureOut">
               <a:rPr lang="en-US" smtClean="0"/>
-              <a:t>7/22/2019</a:t>
+              <a:t>8/6/2019</a:t>
             </a:fld>
             <a:endParaRPr lang="en-US"/>
           </a:p>
@@ -1610,7 +1610,7 @@
           <a:p>
             <a:fld id="{71E1F26E-4D96-464F-8976-1978778C0E8A}" type="datetimeFigureOut">
               <a:rPr lang="en-US" smtClean="0"/>
-              <a:t>7/22/2019</a:t>
+              <a:t>8/6/2019</a:t>
             </a:fld>
             <a:endParaRPr lang="en-US"/>
           </a:p>
@@ -1728,7 +1728,7 @@
           <a:p>
             <a:fld id="{71E1F26E-4D96-464F-8976-1978778C0E8A}" type="datetimeFigureOut">
               <a:rPr lang="en-US" smtClean="0"/>
-              <a:t>7/22/2019</a:t>
+              <a:t>8/6/2019</a:t>
             </a:fld>
             <a:endParaRPr lang="en-US"/>
           </a:p>
@@ -1823,7 +1823,7 @@
           <a:p>
             <a:fld id="{71E1F26E-4D96-464F-8976-1978778C0E8A}" type="datetimeFigureOut">
               <a:rPr lang="en-US" smtClean="0"/>
-              <a:t>7/22/2019</a:t>
+              <a:t>8/6/2019</a:t>
             </a:fld>
             <a:endParaRPr lang="en-US"/>
           </a:p>
@@ -2100,7 +2100,7 @@
           <a:p>
             <a:fld id="{71E1F26E-4D96-464F-8976-1978778C0E8A}" type="datetimeFigureOut">
               <a:rPr lang="en-US" smtClean="0"/>
-              <a:t>7/22/2019</a:t>
+              <a:t>8/6/2019</a:t>
             </a:fld>
             <a:endParaRPr lang="en-US"/>
           </a:p>
@@ -2353,7 +2353,7 @@
           <a:p>
             <a:fld id="{71E1F26E-4D96-464F-8976-1978778C0E8A}" type="datetimeFigureOut">
               <a:rPr lang="en-US" smtClean="0"/>
-              <a:t>7/22/2019</a:t>
+              <a:t>8/6/2019</a:t>
             </a:fld>
             <a:endParaRPr lang="en-US"/>
           </a:p>
@@ -2566,7 +2566,7 @@
           <a:p>
             <a:fld id="{71E1F26E-4D96-464F-8976-1978778C0E8A}" type="datetimeFigureOut">
               <a:rPr lang="en-US" smtClean="0"/>
-              <a:t>7/22/2019</a:t>
+              <a:t>8/6/2019</a:t>
             </a:fld>
             <a:endParaRPr lang="en-US"/>
           </a:p>
@@ -3773,11 +3773,7 @@
             </a:r>
             <a:r>
               <a:rPr lang="en-US" sz="2000" dirty="0" smtClean="0"/>
-              <a:t> fetch the ‘develop’ branch to the local </a:t>
-            </a:r>
-            <a:r>
-              <a:rPr lang="en-US" sz="2000" dirty="0" smtClean="0"/>
-              <a:t>repo (You need go to the </a:t>
+              <a:t> fetch the ‘develop’ branch to the local repo (You need go to the </a:t>
             </a:r>
             <a:r>
               <a:rPr lang="en-US" sz="2000" smtClean="0"/>
@@ -4230,8 +4226,8 @@
         </p:nvSpPr>
         <p:spPr>
           <a:xfrm>
-            <a:off x="1155290" y="1553496"/>
-            <a:ext cx="10456607" cy="2031325"/>
+            <a:off x="867696" y="2369573"/>
+            <a:ext cx="10456607" cy="923330"/>
           </a:xfrm>
           <a:prstGeom prst="rect">
             <a:avLst/>
@@ -4276,57 +4272,19 @@
                   </a:schemeClr>
                 </a:solidFill>
               </a:rPr>
-              <a:t> tag v1.1</a:t>
-            </a:r>
-          </a:p>
-          <a:p>
-            <a:endParaRPr lang="en-US" dirty="0"/>
-          </a:p>
-          <a:p>
-            <a:r>
-              <a:rPr lang="en-US" dirty="0" smtClean="0"/>
-              <a:t>There is also a </a:t>
-            </a:r>
-            <a:r>
-              <a:rPr lang="en-US" dirty="0" err="1" smtClean="0"/>
-              <a:t>config</a:t>
-            </a:r>
-            <a:r>
-              <a:rPr lang="en-US" dirty="0" smtClean="0"/>
-              <a:t> parameter of ‘</a:t>
-            </a:r>
-            <a:r>
-              <a:rPr lang="en-US" dirty="0" err="1" smtClean="0"/>
-              <a:t>programVersion</a:t>
-            </a:r>
-            <a:r>
-              <a:rPr lang="en-US" dirty="0" smtClean="0"/>
-              <a:t>’ in </a:t>
-            </a:r>
-            <a:r>
-              <a:rPr lang="en-US" dirty="0" err="1" smtClean="0"/>
-              <a:t>Pollynet_Processing_Chain</a:t>
-            </a:r>
-            <a:r>
-              <a:rPr lang="en-US" dirty="0" smtClean="0"/>
-              <a:t>/</a:t>
-            </a:r>
-            <a:r>
-              <a:rPr lang="en-US" dirty="0" err="1" smtClean="0"/>
-              <a:t>config</a:t>
-            </a:r>
-            <a:r>
-              <a:rPr lang="en-US" dirty="0" smtClean="0"/>
-              <a:t>/</a:t>
-            </a:r>
-            <a:r>
-              <a:rPr lang="en-US" dirty="0" err="1" smtClean="0"/>
-              <a:t>pollynet_processing_chain_config.json</a:t>
-            </a:r>
-            <a:r>
-              <a:rPr lang="en-US" dirty="0" smtClean="0"/>
-              <a:t>. Remember those two version number should be unified.</a:t>
-            </a:r>
+              <a:t> tag </a:t>
+            </a:r>
+            <a:r>
+              <a:rPr lang="en-US" dirty="0" smtClean="0">
+                <a:solidFill>
+                  <a:schemeClr val="accent2">
+                    <a:lumMod val="75000"/>
+                  </a:schemeClr>
+                </a:solidFill>
+              </a:rPr>
+              <a:t>v1.1</a:t>
+            </a:r>
+            <a:endParaRPr lang="en-US" dirty="0" smtClean="0"/>
           </a:p>
         </p:txBody>
       </p:sp>

</xml_diff>